<commit_message>
Updating the link to the Workload Consolidaiton Presentation
</commit_message>
<xml_diff>
--- a/presentations/Industrial-Protocols.pptx
+++ b/presentations/Industrial-Protocols.pptx
@@ -28485,6 +28485,35 @@
         <p:txBody>
           <a:bodyPr/>
           <a:lstStyle/>
+          <a:p>
+            <a:pPr marL="342900" indent="-342900">
+              <a:buFont typeface="Arial" panose="020B0604020202020204" pitchFamily="34" charset="0"/>
+              <a:buChar char="•"/>
+            </a:pPr>
+            <a:r>
+              <a:rPr lang="en-US" dirty="0" smtClean="0">
+                <a:hlinkClick r:id="rId2"/>
+              </a:rPr>
+              <a:t>MQTT.org</a:t>
+            </a:r>
+            <a:endParaRPr lang="en-US" dirty="0" smtClean="0"/>
+          </a:p>
+          <a:p>
+            <a:pPr marL="342900" indent="-342900">
+              <a:buFont typeface="Arial" panose="020B0604020202020204" pitchFamily="34" charset="0"/>
+              <a:buChar char="•"/>
+            </a:pPr>
+            <a:r>
+              <a:rPr lang="en-US" dirty="0" smtClean="0">
+                <a:hlinkClick r:id="rId3"/>
+              </a:rPr>
+              <a:t>Publishing Sensor Data with MQTT Video</a:t>
+            </a:r>
+            <a:r>
+              <a:rPr lang="en-US" dirty="0" smtClean="0"/>
+              <a:t> </a:t>
+            </a:r>
+          </a:p>
           <a:p>
             <a:pPr marL="342900" indent="-342900">
               <a:buFont typeface="Arial" panose="020B0604020202020204" pitchFamily="34" charset="0"/>

</xml_diff>